<commit_message>
Updated Projektvorbereitung, Zeitplan u. Präsi
</commit_message>
<xml_diff>
--- a/Projektvorbereitung/Projektvorbereitung.pptx
+++ b/Projektvorbereitung/Projektvorbereitung.pptx
@@ -16,6 +16,8 @@
     <p:sldId id="261" r:id="rId10"/>
     <p:sldId id="265" r:id="rId11"/>
     <p:sldId id="264" r:id="rId12"/>
+    <p:sldId id="267" r:id="rId13"/>
+    <p:sldId id="268" r:id="rId14"/>
   </p:sldIdLst>
   <p:sldSz cx="12192000" cy="6858000"/>
   <p:notesSz cx="6858000" cy="9144000"/>
@@ -3700,6 +3702,172 @@
 </p:sld>
 </file>
 
+<file path=ppt/slides/slide12.xml><?xml version="1.0" encoding="utf-8"?>
+<p:sld xmlns:a="http://schemas.openxmlformats.org/drawingml/2006/main" xmlns:r="http://schemas.openxmlformats.org/officeDocument/2006/relationships" xmlns:p="http://schemas.openxmlformats.org/presentationml/2006/main">
+  <p:cSld>
+    <p:spTree>
+      <p:nvGrpSpPr>
+        <p:cNvPr id="1" name=""/>
+        <p:cNvGrpSpPr/>
+        <p:nvPr/>
+      </p:nvGrpSpPr>
+      <p:grpSpPr>
+        <a:xfrm>
+          <a:off x="0" y="0"/>
+          <a:ext cx="0" cy="0"/>
+          <a:chOff x="0" y="0"/>
+          <a:chExt cx="0" cy="0"/>
+        </a:xfrm>
+      </p:grpSpPr>
+      <p:sp>
+        <p:nvSpPr>
+          <p:cNvPr id="2" name="Titel 1">
+            <a:extLst>
+              <a:ext uri="{FF2B5EF4-FFF2-40B4-BE49-F238E27FC236}">
+                <a16:creationId xmlns:a16="http://schemas.microsoft.com/office/drawing/2014/main" id="{D6B2F3CC-AF0D-2FD9-2A38-0949B8CDFF59}"/>
+              </a:ext>
+            </a:extLst>
+          </p:cNvPr>
+          <p:cNvSpPr>
+            <a:spLocks noGrp="1"/>
+          </p:cNvSpPr>
+          <p:nvPr>
+            <p:ph type="title"/>
+          </p:nvPr>
+        </p:nvSpPr>
+        <p:spPr/>
+        <p:txBody>
+          <a:bodyPr/>
+          <a:lstStyle/>
+          <a:p>
+            <a:r>
+              <a:rPr lang="de-DE" dirty="0"/>
+              <a:t>Szenario</a:t>
+            </a:r>
+          </a:p>
+        </p:txBody>
+      </p:sp>
+      <p:sp>
+        <p:nvSpPr>
+          <p:cNvPr id="3" name="Inhaltsplatzhalter 2">
+            <a:extLst>
+              <a:ext uri="{FF2B5EF4-FFF2-40B4-BE49-F238E27FC236}">
+                <a16:creationId xmlns:a16="http://schemas.microsoft.com/office/drawing/2014/main" id="{D692C9C1-1199-A29E-9F59-054C734C241E}"/>
+              </a:ext>
+            </a:extLst>
+          </p:cNvPr>
+          <p:cNvSpPr>
+            <a:spLocks noGrp="1"/>
+          </p:cNvSpPr>
+          <p:nvPr>
+            <p:ph idx="1"/>
+          </p:nvPr>
+        </p:nvSpPr>
+        <p:spPr/>
+        <p:txBody>
+          <a:bodyPr/>
+          <a:lstStyle/>
+          <a:p>
+            <a:endParaRPr lang="de-DE" dirty="0"/>
+          </a:p>
+        </p:txBody>
+      </p:sp>
+    </p:spTree>
+    <p:extLst>
+      <p:ext uri="{BB962C8B-B14F-4D97-AF65-F5344CB8AC3E}">
+        <p14:creationId xmlns:p14="http://schemas.microsoft.com/office/powerpoint/2010/main" val="230732061"/>
+      </p:ext>
+    </p:extLst>
+  </p:cSld>
+  <p:clrMapOvr>
+    <a:masterClrMapping/>
+  </p:clrMapOvr>
+</p:sld>
+</file>
+
+<file path=ppt/slides/slide13.xml><?xml version="1.0" encoding="utf-8"?>
+<p:sld xmlns:a="http://schemas.openxmlformats.org/drawingml/2006/main" xmlns:r="http://schemas.openxmlformats.org/officeDocument/2006/relationships" xmlns:p="http://schemas.openxmlformats.org/presentationml/2006/main">
+  <p:cSld>
+    <p:spTree>
+      <p:nvGrpSpPr>
+        <p:cNvPr id="1" name=""/>
+        <p:cNvGrpSpPr/>
+        <p:nvPr/>
+      </p:nvGrpSpPr>
+      <p:grpSpPr>
+        <a:xfrm>
+          <a:off x="0" y="0"/>
+          <a:ext cx="0" cy="0"/>
+          <a:chOff x="0" y="0"/>
+          <a:chExt cx="0" cy="0"/>
+        </a:xfrm>
+      </p:grpSpPr>
+      <p:sp>
+        <p:nvSpPr>
+          <p:cNvPr id="2" name="Titel 1">
+            <a:extLst>
+              <a:ext uri="{FF2B5EF4-FFF2-40B4-BE49-F238E27FC236}">
+                <a16:creationId xmlns:a16="http://schemas.microsoft.com/office/drawing/2014/main" id="{C3872F0D-4E0B-E9DF-931D-26769B279528}"/>
+              </a:ext>
+            </a:extLst>
+          </p:cNvPr>
+          <p:cNvSpPr>
+            <a:spLocks noGrp="1"/>
+          </p:cNvSpPr>
+          <p:nvPr>
+            <p:ph type="title"/>
+          </p:nvPr>
+        </p:nvSpPr>
+        <p:spPr/>
+        <p:txBody>
+          <a:bodyPr/>
+          <a:lstStyle/>
+          <a:p>
+            <a:r>
+              <a:rPr lang="de-DE" dirty="0"/>
+              <a:t>Szenario</a:t>
+            </a:r>
+          </a:p>
+        </p:txBody>
+      </p:sp>
+      <p:sp>
+        <p:nvSpPr>
+          <p:cNvPr id="3" name="Inhaltsplatzhalter 2">
+            <a:extLst>
+              <a:ext uri="{FF2B5EF4-FFF2-40B4-BE49-F238E27FC236}">
+                <a16:creationId xmlns:a16="http://schemas.microsoft.com/office/drawing/2014/main" id="{CAA8D718-CA9A-4205-80A3-DAC5DB0717F9}"/>
+              </a:ext>
+            </a:extLst>
+          </p:cNvPr>
+          <p:cNvSpPr>
+            <a:spLocks noGrp="1"/>
+          </p:cNvSpPr>
+          <p:nvPr>
+            <p:ph idx="1"/>
+          </p:nvPr>
+        </p:nvSpPr>
+        <p:spPr/>
+        <p:txBody>
+          <a:bodyPr/>
+          <a:lstStyle/>
+          <a:p>
+            <a:endParaRPr lang="de-DE"/>
+          </a:p>
+        </p:txBody>
+      </p:sp>
+    </p:spTree>
+    <p:extLst>
+      <p:ext uri="{BB962C8B-B14F-4D97-AF65-F5344CB8AC3E}">
+        <p14:creationId xmlns:p14="http://schemas.microsoft.com/office/powerpoint/2010/main" val="352792552"/>
+      </p:ext>
+    </p:extLst>
+  </p:cSld>
+  <p:clrMapOvr>
+    <a:masterClrMapping/>
+  </p:clrMapOvr>
+</p:sld>
+</file>
+
 <file path=ppt/slides/slide2.xml><?xml version="1.0" encoding="utf-8"?>
 <p:sld xmlns:a="http://schemas.openxmlformats.org/drawingml/2006/main" xmlns:r="http://schemas.openxmlformats.org/officeDocument/2006/relationships" xmlns:p="http://schemas.openxmlformats.org/presentationml/2006/main">
   <p:cSld>
@@ -4153,6 +4321,15 @@
         <p:txBody>
           <a:bodyPr/>
           <a:lstStyle/>
+          <a:p>
+            <a:pPr marL="0" indent="0">
+              <a:buNone/>
+            </a:pPr>
+            <a:r>
+              <a:rPr lang="de-DE" b="1" dirty="0"/>
+              <a:t>Milestones</a:t>
+            </a:r>
+          </a:p>
           <a:p>
             <a:pPr marL="342900" indent="-342900">
               <a:buFont typeface="+mj-lt"/>

</xml_diff>